<commit_message>
Präsentation ein wenig weiter bearb.
</commit_message>
<xml_diff>
--- a/Präsentation/Hamster Holzer Kleinekort.pptx
+++ b/Präsentation/Hamster Holzer Kleinekort.pptx
@@ -7,11 +7,13 @@
   <p:sldIdLst>
     <p:sldId id="256" r:id="rId2"/>
     <p:sldId id="257" r:id="rId3"/>
-    <p:sldId id="258" r:id="rId4"/>
-    <p:sldId id="261" r:id="rId5"/>
-    <p:sldId id="260" r:id="rId6"/>
-    <p:sldId id="262" r:id="rId7"/>
-    <p:sldId id="263" r:id="rId8"/>
+    <p:sldId id="264" r:id="rId4"/>
+    <p:sldId id="265" r:id="rId5"/>
+    <p:sldId id="258" r:id="rId6"/>
+    <p:sldId id="261" r:id="rId7"/>
+    <p:sldId id="260" r:id="rId8"/>
+    <p:sldId id="262" r:id="rId9"/>
+    <p:sldId id="263" r:id="rId10"/>
   </p:sldIdLst>
   <p:sldSz cx="9144000" cy="6858000" type="screen4x3"/>
   <p:notesSz cx="6858000" cy="9144000"/>
@@ -112,7 +114,7 @@
   </p:defaultTextStyle>
   <p:extLst>
     <p:ext uri="{EFAFB233-063F-42B5-8137-9DF3F51BA10A}">
-      <p15:sldGuideLst xmlns:p15="http://schemas.microsoft.com/office/powerpoint/2012/main"/>
+      <p15:sldGuideLst xmlns:p15="http://schemas.microsoft.com/office/powerpoint/2012/main" xmlns=""/>
     </p:ext>
   </p:extLst>
 </p:presentation>
@@ -7962,12 +7964,13 @@
           <c:showPercent val="0"/>
           <c:showBubbleSize val="0"/>
         </c:dLbls>
+        <c:marker val="1"/>
         <c:smooth val="0"/>
-        <c:axId val="236202688"/>
-        <c:axId val="236207392"/>
+        <c:axId val="4614016"/>
+        <c:axId val="4615552"/>
       </c:lineChart>
       <c:catAx>
-        <c:axId val="236202688"/>
+        <c:axId val="4614016"/>
         <c:scaling>
           <c:orientation val="minMax"/>
         </c:scaling>
@@ -8010,7 +8013,7 @@
             <a:endParaRPr lang="de-DE"/>
           </a:p>
         </c:txPr>
-        <c:crossAx val="236207392"/>
+        <c:crossAx val="4615552"/>
         <c:crosses val="autoZero"/>
         <c:auto val="1"/>
         <c:lblAlgn val="ctr"/>
@@ -8018,7 +8021,7 @@
         <c:noMultiLvlLbl val="0"/>
       </c:catAx>
       <c:valAx>
-        <c:axId val="236207392"/>
+        <c:axId val="4615552"/>
         <c:scaling>
           <c:orientation val="minMax"/>
           <c:max val="1"/>
@@ -8070,7 +8073,7 @@
             <a:endParaRPr lang="de-DE"/>
           </a:p>
         </c:txPr>
-        <c:crossAx val="236202688"/>
+        <c:crossAx val="4614016"/>
         <c:crosses val="autoZero"/>
         <c:crossBetween val="between"/>
       </c:valAx>
@@ -8135,7 +8138,7 @@
       <a:endParaRPr lang="de-DE"/>
     </a:p>
   </c:txPr>
-  <c:externalData r:id="rId3">
+  <c:externalData r:id="rId1">
     <c:autoUpdate val="0"/>
   </c:externalData>
 </c:chartSpace>
@@ -11305,7 +11308,6 @@
               <a:rPr lang="de-DE" dirty="0" smtClean="0"/>
               <a:t>Mögliche Verbesserungen bei anderer Aufgabenstellung</a:t>
             </a:r>
-            <a:endParaRPr lang="de-DE" dirty="0" smtClean="0"/>
           </a:p>
           <a:p>
             <a:r>
@@ -11808,6 +11810,214 @@
           <a:p>
             <a:r>
               <a:rPr lang="de-DE" dirty="0" smtClean="0"/>
+              <a:t>Lösungsansätze</a:t>
+            </a:r>
+            <a:endParaRPr lang="de-DE" dirty="0"/>
+          </a:p>
+        </p:txBody>
+      </p:sp>
+      <p:sp>
+        <p:nvSpPr>
+          <p:cNvPr id="3" name="Inhaltsplatzhalter 2"/>
+          <p:cNvSpPr>
+            <a:spLocks noGrp="1"/>
+          </p:cNvSpPr>
+          <p:nvPr>
+            <p:ph idx="1"/>
+          </p:nvPr>
+        </p:nvSpPr>
+        <p:spPr/>
+        <p:txBody>
+          <a:bodyPr/>
+          <a:lstStyle/>
+          <a:p>
+            <a:r>
+              <a:rPr lang="de-DE" dirty="0" smtClean="0"/>
+              <a:t>Zufälliger Weg des Hamsters</a:t>
+            </a:r>
+          </a:p>
+          <a:p>
+            <a:r>
+              <a:rPr lang="de-DE" dirty="0" smtClean="0"/>
+              <a:t>Hamster bewegt sich nach striktem Muster</a:t>
+            </a:r>
+          </a:p>
+          <a:p>
+            <a:pPr lvl="1"/>
+            <a:r>
+              <a:rPr lang="de-DE" dirty="0" smtClean="0"/>
+              <a:t>Spirale</a:t>
+            </a:r>
+          </a:p>
+          <a:p>
+            <a:pPr lvl="1"/>
+            <a:r>
+              <a:rPr lang="de-DE" dirty="0" smtClean="0"/>
+              <a:t>Schlangenlinien</a:t>
+            </a:r>
+          </a:p>
+          <a:p>
+            <a:pPr lvl="1"/>
+            <a:r>
+              <a:rPr lang="de-DE" dirty="0" smtClean="0"/>
+              <a:t>…</a:t>
+            </a:r>
+            <a:endParaRPr lang="de-DE" dirty="0"/>
+          </a:p>
+          <a:p>
+            <a:r>
+              <a:rPr lang="de-DE" dirty="0" smtClean="0"/>
+              <a:t>Hamster bewegt sich vorwärts bis zu einer Mauer und entscheidet sich dann zufällig</a:t>
+            </a:r>
+          </a:p>
+          <a:p>
+            <a:endParaRPr lang="de-DE" dirty="0" smtClean="0"/>
+          </a:p>
+        </p:txBody>
+      </p:sp>
+    </p:spTree>
+    <p:extLst>
+      <p:ext uri="{BB962C8B-B14F-4D97-AF65-F5344CB8AC3E}">
+        <p14:creationId xmlns:p14="http://schemas.microsoft.com/office/powerpoint/2010/main" val="4167991657"/>
+      </p:ext>
+    </p:extLst>
+  </p:cSld>
+  <p:clrMapOvr>
+    <a:masterClrMapping/>
+  </p:clrMapOvr>
+  <p:timing>
+    <p:tnLst>
+      <p:par>
+        <p:cTn id="1" dur="indefinite" restart="never" nodeType="tmRoot"/>
+      </p:par>
+    </p:tnLst>
+  </p:timing>
+</p:sld>
+</file>
+
+<file path=ppt/slides/slide4.xml><?xml version="1.0" encoding="utf-8"?>
+<p:sld xmlns:a="http://schemas.openxmlformats.org/drawingml/2006/main" xmlns:r="http://schemas.openxmlformats.org/officeDocument/2006/relationships" xmlns:p="http://schemas.openxmlformats.org/presentationml/2006/main">
+  <p:cSld>
+    <p:spTree>
+      <p:nvGrpSpPr>
+        <p:cNvPr id="1" name=""/>
+        <p:cNvGrpSpPr/>
+        <p:nvPr/>
+      </p:nvGrpSpPr>
+      <p:grpSpPr>
+        <a:xfrm>
+          <a:off x="0" y="0"/>
+          <a:ext cx="0" cy="0"/>
+          <a:chOff x="0" y="0"/>
+          <a:chExt cx="0" cy="0"/>
+        </a:xfrm>
+      </p:grpSpPr>
+      <p:sp>
+        <p:nvSpPr>
+          <p:cNvPr id="2" name="Titel 1"/>
+          <p:cNvSpPr>
+            <a:spLocks noGrp="1"/>
+          </p:cNvSpPr>
+          <p:nvPr>
+            <p:ph type="title"/>
+          </p:nvPr>
+        </p:nvSpPr>
+        <p:spPr/>
+        <p:txBody>
+          <a:bodyPr/>
+          <a:lstStyle/>
+          <a:p>
+            <a:r>
+              <a:rPr lang="de-DE" dirty="0" smtClean="0"/>
+              <a:t>Unser Weg zur Lösung</a:t>
+            </a:r>
+            <a:endParaRPr lang="de-DE" dirty="0"/>
+          </a:p>
+        </p:txBody>
+      </p:sp>
+      <p:sp>
+        <p:nvSpPr>
+          <p:cNvPr id="3" name="Inhaltsplatzhalter 2"/>
+          <p:cNvSpPr>
+            <a:spLocks noGrp="1"/>
+          </p:cNvSpPr>
+          <p:nvPr>
+            <p:ph idx="1"/>
+          </p:nvPr>
+        </p:nvSpPr>
+        <p:spPr/>
+        <p:txBody>
+          <a:bodyPr/>
+          <a:lstStyle/>
+          <a:p>
+            <a:r>
+              <a:rPr lang="de-DE" dirty="0" smtClean="0"/>
+              <a:t>//Kommentar </a:t>
+            </a:r>
+          </a:p>
+          <a:p>
+            <a:r>
+              <a:rPr lang="de-DE" dirty="0" smtClean="0"/>
+              <a:t>Kombination aus einem strikten Muster (Schlangenlinien) und einer Zufallskomponente</a:t>
+            </a:r>
+            <a:endParaRPr lang="de-DE" dirty="0"/>
+          </a:p>
+        </p:txBody>
+      </p:sp>
+    </p:spTree>
+    <p:extLst>
+      <p:ext uri="{BB962C8B-B14F-4D97-AF65-F5344CB8AC3E}">
+        <p14:creationId xmlns:p14="http://schemas.microsoft.com/office/powerpoint/2010/main" val="341908791"/>
+      </p:ext>
+    </p:extLst>
+  </p:cSld>
+  <p:clrMapOvr>
+    <a:masterClrMapping/>
+  </p:clrMapOvr>
+  <p:timing>
+    <p:tnLst>
+      <p:par>
+        <p:cTn id="1" dur="indefinite" restart="never" nodeType="tmRoot"/>
+      </p:par>
+    </p:tnLst>
+  </p:timing>
+</p:sld>
+</file>
+
+<file path=ppt/slides/slide5.xml><?xml version="1.0" encoding="utf-8"?>
+<p:sld xmlns:a="http://schemas.openxmlformats.org/drawingml/2006/main" xmlns:r="http://schemas.openxmlformats.org/officeDocument/2006/relationships" xmlns:p="http://schemas.openxmlformats.org/presentationml/2006/main">
+  <p:cSld>
+    <p:spTree>
+      <p:nvGrpSpPr>
+        <p:cNvPr id="1" name=""/>
+        <p:cNvGrpSpPr/>
+        <p:nvPr/>
+      </p:nvGrpSpPr>
+      <p:grpSpPr>
+        <a:xfrm>
+          <a:off x="0" y="0"/>
+          <a:ext cx="0" cy="0"/>
+          <a:chOff x="0" y="0"/>
+          <a:chExt cx="0" cy="0"/>
+        </a:xfrm>
+      </p:grpSpPr>
+      <p:sp>
+        <p:nvSpPr>
+          <p:cNvPr id="2" name="Titel 1"/>
+          <p:cNvSpPr>
+            <a:spLocks noGrp="1"/>
+          </p:cNvSpPr>
+          <p:nvPr>
+            <p:ph type="title"/>
+          </p:nvPr>
+        </p:nvSpPr>
+        <p:spPr/>
+        <p:txBody>
+          <a:bodyPr/>
+          <a:lstStyle/>
+          <a:p>
+            <a:r>
+              <a:rPr lang="de-DE" dirty="0" smtClean="0"/>
               <a:t>Effizienzanalyse des Hamsters</a:t>
             </a:r>
             <a:endParaRPr lang="de-DE" dirty="0"/>
@@ -12195,7 +12405,7 @@
 </p:sld>
 </file>
 
-<file path=ppt/slides/slide4.xml><?xml version="1.0" encoding="utf-8"?>
+<file path=ppt/slides/slide6.xml><?xml version="1.0" encoding="utf-8"?>
 <p:sld xmlns:a="http://schemas.openxmlformats.org/drawingml/2006/main" xmlns:r="http://schemas.openxmlformats.org/officeDocument/2006/relationships" xmlns:p="http://schemas.openxmlformats.org/presentationml/2006/main">
   <p:cSld>
     <p:spTree>
@@ -12376,10 +12586,17 @@
   <p:clrMapOvr>
     <a:masterClrMapping/>
   </p:clrMapOvr>
+  <p:timing>
+    <p:tnLst>
+      <p:par>
+        <p:cTn id="1" dur="indefinite" restart="never" nodeType="tmRoot"/>
+      </p:par>
+    </p:tnLst>
+  </p:timing>
 </p:sld>
 </file>
 
-<file path=ppt/slides/slide5.xml><?xml version="1.0" encoding="utf-8"?>
+<file path=ppt/slides/slide7.xml><?xml version="1.0" encoding="utf-8"?>
 <p:sld xmlns:a="http://schemas.openxmlformats.org/drawingml/2006/main" xmlns:r="http://schemas.openxmlformats.org/officeDocument/2006/relationships" xmlns:p="http://schemas.openxmlformats.org/presentationml/2006/main">
   <p:cSld>
     <p:spTree>
@@ -12770,10 +12987,17 @@
   <p:clrMapOvr>
     <a:masterClrMapping/>
   </p:clrMapOvr>
+  <p:timing>
+    <p:tnLst>
+      <p:par>
+        <p:cTn id="1" dur="indefinite" restart="never" nodeType="tmRoot"/>
+      </p:par>
+    </p:tnLst>
+  </p:timing>
 </p:sld>
 </file>
 
-<file path=ppt/slides/slide6.xml><?xml version="1.0" encoding="utf-8"?>
+<file path=ppt/slides/slide8.xml><?xml version="1.0" encoding="utf-8"?>
 <p:sld xmlns:a="http://schemas.openxmlformats.org/drawingml/2006/main" xmlns:r="http://schemas.openxmlformats.org/officeDocument/2006/relationships" xmlns:p="http://schemas.openxmlformats.org/presentationml/2006/main">
   <p:cSld>
     <p:spTree>
@@ -12830,8 +13054,38 @@
           <a:p>
             <a:r>
               <a:rPr lang="de-DE" dirty="0" smtClean="0"/>
-              <a:t>Hamster ist gut auf Territorien</a:t>
+              <a:t>Hamster ist gut auf </a:t>
             </a:r>
+            <a:r>
+              <a:rPr lang="de-DE" dirty="0" smtClean="0"/>
+              <a:t>Territorien</a:t>
+            </a:r>
+          </a:p>
+          <a:p>
+            <a:r>
+              <a:rPr lang="de-DE" dirty="0" smtClean="0"/>
+              <a:t>Liefert kein zuverlässiges Ergebnis</a:t>
+            </a:r>
+          </a:p>
+          <a:p>
+            <a:r>
+              <a:rPr lang="de-DE" dirty="0" smtClean="0"/>
+              <a:t>Passt sich auf unterschiedlichen Größen gut an</a:t>
+            </a:r>
+          </a:p>
+          <a:p>
+            <a:r>
+              <a:rPr lang="de-DE" dirty="0" smtClean="0"/>
+              <a:t>Endlosschleifen in bestimmten Territorien nicht möglich (wird durch zufällige Züge verhindert)</a:t>
+            </a:r>
+          </a:p>
+          <a:p>
+            <a:r>
+              <a:rPr lang="de-DE" dirty="0" smtClean="0"/>
+              <a:t>Besitzt keine „Intelligenz“</a:t>
+            </a:r>
+          </a:p>
+          <a:p>
             <a:endParaRPr lang="de-DE" dirty="0"/>
           </a:p>
         </p:txBody>
@@ -12958,6 +13212,250 @@
                       </p:childTnLst>
                     </p:cTn>
                   </p:par>
+                  <p:par>
+                    <p:cTn id="8" fill="hold">
+                      <p:stCondLst>
+                        <p:cond delay="indefinite"/>
+                      </p:stCondLst>
+                      <p:childTnLst>
+                        <p:par>
+                          <p:cTn id="9" fill="hold">
+                            <p:stCondLst>
+                              <p:cond delay="0"/>
+                            </p:stCondLst>
+                            <p:childTnLst>
+                              <p:par>
+                                <p:cTn id="10" presetID="10" presetClass="entr" presetSubtype="0" fill="hold" grpId="0" nodeType="clickEffect">
+                                  <p:stCondLst>
+                                    <p:cond delay="0"/>
+                                  </p:stCondLst>
+                                  <p:childTnLst>
+                                    <p:set>
+                                      <p:cBhvr>
+                                        <p:cTn id="11" dur="1" fill="hold">
+                                          <p:stCondLst>
+                                            <p:cond delay="0"/>
+                                          </p:stCondLst>
+                                        </p:cTn>
+                                        <p:tgtEl>
+                                          <p:spTgt spid="3">
+                                            <p:txEl>
+                                              <p:pRg st="1" end="1"/>
+                                            </p:txEl>
+                                          </p:spTgt>
+                                        </p:tgtEl>
+                                        <p:attrNameLst>
+                                          <p:attrName>style.visibility</p:attrName>
+                                        </p:attrNameLst>
+                                      </p:cBhvr>
+                                      <p:to>
+                                        <p:strVal val="visible"/>
+                                      </p:to>
+                                    </p:set>
+                                    <p:animEffect transition="in" filter="fade">
+                                      <p:cBhvr>
+                                        <p:cTn id="12" dur="500"/>
+                                        <p:tgtEl>
+                                          <p:spTgt spid="3">
+                                            <p:txEl>
+                                              <p:pRg st="1" end="1"/>
+                                            </p:txEl>
+                                          </p:spTgt>
+                                        </p:tgtEl>
+                                      </p:cBhvr>
+                                    </p:animEffect>
+                                  </p:childTnLst>
+                                </p:cTn>
+                              </p:par>
+                            </p:childTnLst>
+                          </p:cTn>
+                        </p:par>
+                      </p:childTnLst>
+                    </p:cTn>
+                  </p:par>
+                  <p:par>
+                    <p:cTn id="13" fill="hold">
+                      <p:stCondLst>
+                        <p:cond delay="indefinite"/>
+                      </p:stCondLst>
+                      <p:childTnLst>
+                        <p:par>
+                          <p:cTn id="14" fill="hold">
+                            <p:stCondLst>
+                              <p:cond delay="0"/>
+                            </p:stCondLst>
+                            <p:childTnLst>
+                              <p:par>
+                                <p:cTn id="15" presetID="10" presetClass="entr" presetSubtype="0" fill="hold" grpId="0" nodeType="clickEffect">
+                                  <p:stCondLst>
+                                    <p:cond delay="0"/>
+                                  </p:stCondLst>
+                                  <p:childTnLst>
+                                    <p:set>
+                                      <p:cBhvr>
+                                        <p:cTn id="16" dur="1" fill="hold">
+                                          <p:stCondLst>
+                                            <p:cond delay="0"/>
+                                          </p:stCondLst>
+                                        </p:cTn>
+                                        <p:tgtEl>
+                                          <p:spTgt spid="3">
+                                            <p:txEl>
+                                              <p:pRg st="2" end="2"/>
+                                            </p:txEl>
+                                          </p:spTgt>
+                                        </p:tgtEl>
+                                        <p:attrNameLst>
+                                          <p:attrName>style.visibility</p:attrName>
+                                        </p:attrNameLst>
+                                      </p:cBhvr>
+                                      <p:to>
+                                        <p:strVal val="visible"/>
+                                      </p:to>
+                                    </p:set>
+                                    <p:animEffect transition="in" filter="fade">
+                                      <p:cBhvr>
+                                        <p:cTn id="17" dur="500"/>
+                                        <p:tgtEl>
+                                          <p:spTgt spid="3">
+                                            <p:txEl>
+                                              <p:pRg st="2" end="2"/>
+                                            </p:txEl>
+                                          </p:spTgt>
+                                        </p:tgtEl>
+                                      </p:cBhvr>
+                                    </p:animEffect>
+                                  </p:childTnLst>
+                                </p:cTn>
+                              </p:par>
+                            </p:childTnLst>
+                          </p:cTn>
+                        </p:par>
+                      </p:childTnLst>
+                    </p:cTn>
+                  </p:par>
+                  <p:par>
+                    <p:cTn id="18" fill="hold">
+                      <p:stCondLst>
+                        <p:cond delay="indefinite"/>
+                      </p:stCondLst>
+                      <p:childTnLst>
+                        <p:par>
+                          <p:cTn id="19" fill="hold">
+                            <p:stCondLst>
+                              <p:cond delay="0"/>
+                            </p:stCondLst>
+                            <p:childTnLst>
+                              <p:par>
+                                <p:cTn id="20" presetID="10" presetClass="entr" presetSubtype="0" fill="hold" grpId="0" nodeType="clickEffect">
+                                  <p:stCondLst>
+                                    <p:cond delay="0"/>
+                                  </p:stCondLst>
+                                  <p:childTnLst>
+                                    <p:set>
+                                      <p:cBhvr>
+                                        <p:cTn id="21" dur="1" fill="hold">
+                                          <p:stCondLst>
+                                            <p:cond delay="0"/>
+                                          </p:stCondLst>
+                                        </p:cTn>
+                                        <p:tgtEl>
+                                          <p:spTgt spid="3">
+                                            <p:txEl>
+                                              <p:pRg st="3" end="3"/>
+                                            </p:txEl>
+                                          </p:spTgt>
+                                        </p:tgtEl>
+                                        <p:attrNameLst>
+                                          <p:attrName>style.visibility</p:attrName>
+                                        </p:attrNameLst>
+                                      </p:cBhvr>
+                                      <p:to>
+                                        <p:strVal val="visible"/>
+                                      </p:to>
+                                    </p:set>
+                                    <p:animEffect transition="in" filter="fade">
+                                      <p:cBhvr>
+                                        <p:cTn id="22" dur="500"/>
+                                        <p:tgtEl>
+                                          <p:spTgt spid="3">
+                                            <p:txEl>
+                                              <p:pRg st="3" end="3"/>
+                                            </p:txEl>
+                                          </p:spTgt>
+                                        </p:tgtEl>
+                                      </p:cBhvr>
+                                    </p:animEffect>
+                                  </p:childTnLst>
+                                </p:cTn>
+                              </p:par>
+                            </p:childTnLst>
+                          </p:cTn>
+                        </p:par>
+                      </p:childTnLst>
+                    </p:cTn>
+                  </p:par>
+                  <p:par>
+                    <p:cTn id="23" fill="hold">
+                      <p:stCondLst>
+                        <p:cond delay="indefinite"/>
+                      </p:stCondLst>
+                      <p:childTnLst>
+                        <p:par>
+                          <p:cTn id="24" fill="hold">
+                            <p:stCondLst>
+                              <p:cond delay="0"/>
+                            </p:stCondLst>
+                            <p:childTnLst>
+                              <p:par>
+                                <p:cTn id="25" presetID="10" presetClass="entr" presetSubtype="0" fill="hold" grpId="0" nodeType="clickEffect">
+                                  <p:stCondLst>
+                                    <p:cond delay="0"/>
+                                  </p:stCondLst>
+                                  <p:childTnLst>
+                                    <p:set>
+                                      <p:cBhvr>
+                                        <p:cTn id="26" dur="1" fill="hold">
+                                          <p:stCondLst>
+                                            <p:cond delay="0"/>
+                                          </p:stCondLst>
+                                        </p:cTn>
+                                        <p:tgtEl>
+                                          <p:spTgt spid="3">
+                                            <p:txEl>
+                                              <p:pRg st="4" end="4"/>
+                                            </p:txEl>
+                                          </p:spTgt>
+                                        </p:tgtEl>
+                                        <p:attrNameLst>
+                                          <p:attrName>style.visibility</p:attrName>
+                                        </p:attrNameLst>
+                                      </p:cBhvr>
+                                      <p:to>
+                                        <p:strVal val="visible"/>
+                                      </p:to>
+                                    </p:set>
+                                    <p:animEffect transition="in" filter="fade">
+                                      <p:cBhvr>
+                                        <p:cTn id="27" dur="500"/>
+                                        <p:tgtEl>
+                                          <p:spTgt spid="3">
+                                            <p:txEl>
+                                              <p:pRg st="4" end="4"/>
+                                            </p:txEl>
+                                          </p:spTgt>
+                                        </p:tgtEl>
+                                      </p:cBhvr>
+                                    </p:animEffect>
+                                  </p:childTnLst>
+                                </p:cTn>
+                              </p:par>
+                            </p:childTnLst>
+                          </p:cTn>
+                        </p:par>
+                      </p:childTnLst>
+                    </p:cTn>
+                  </p:par>
                 </p:childTnLst>
               </p:cTn>
               <p:prevCondLst>
@@ -12986,7 +13484,7 @@
 </p:sld>
 </file>
 
-<file path=ppt/slides/slide7.xml><?xml version="1.0" encoding="utf-8"?>
+<file path=ppt/slides/slide9.xml><?xml version="1.0" encoding="utf-8"?>
 <p:sld xmlns:a="http://schemas.openxmlformats.org/drawingml/2006/main" xmlns:r="http://schemas.openxmlformats.org/officeDocument/2006/relationships" xmlns:p="http://schemas.openxmlformats.org/presentationml/2006/main">
   <p:cSld>
     <p:spTree>
@@ -13057,7 +13555,17 @@
           <a:p>
             <a:r>
               <a:rPr lang="de-DE" dirty="0" smtClean="0"/>
-              <a:t>Auch im Sichtfeld vorne Körner sehen können.</a:t>
+              <a:t>Auch im Sichtfeld vorne Körner sehen können</a:t>
+            </a:r>
+            <a:r>
+              <a:rPr lang="de-DE" dirty="0" smtClean="0"/>
+              <a:t>.</a:t>
+            </a:r>
+          </a:p>
+          <a:p>
+            <a:r>
+              <a:rPr lang="de-DE" dirty="0" smtClean="0"/>
+              <a:t>„Einfahrphase“ in der der Hamster das Territorium analysiert und speichert</a:t>
             </a:r>
             <a:endParaRPr lang="de-DE" dirty="0"/>
           </a:p>
@@ -13293,6 +13801,67 @@
                                           <p:spTgt spid="3">
                                             <p:txEl>
                                               <p:pRg st="2" end="2"/>
+                                            </p:txEl>
+                                          </p:spTgt>
+                                        </p:tgtEl>
+                                      </p:cBhvr>
+                                    </p:animEffect>
+                                  </p:childTnLst>
+                                </p:cTn>
+                              </p:par>
+                            </p:childTnLst>
+                          </p:cTn>
+                        </p:par>
+                      </p:childTnLst>
+                    </p:cTn>
+                  </p:par>
+                  <p:par>
+                    <p:cTn id="18" fill="hold">
+                      <p:stCondLst>
+                        <p:cond delay="indefinite"/>
+                      </p:stCondLst>
+                      <p:childTnLst>
+                        <p:par>
+                          <p:cTn id="19" fill="hold">
+                            <p:stCondLst>
+                              <p:cond delay="0"/>
+                            </p:stCondLst>
+                            <p:childTnLst>
+                              <p:par>
+                                <p:cTn id="20" presetID="10" presetClass="entr" presetSubtype="0" fill="hold" grpId="0" nodeType="clickEffect">
+                                  <p:stCondLst>
+                                    <p:cond delay="0"/>
+                                  </p:stCondLst>
+                                  <p:childTnLst>
+                                    <p:set>
+                                      <p:cBhvr>
+                                        <p:cTn id="21" dur="1" fill="hold">
+                                          <p:stCondLst>
+                                            <p:cond delay="0"/>
+                                          </p:stCondLst>
+                                        </p:cTn>
+                                        <p:tgtEl>
+                                          <p:spTgt spid="3">
+                                            <p:txEl>
+                                              <p:pRg st="3" end="3"/>
+                                            </p:txEl>
+                                          </p:spTgt>
+                                        </p:tgtEl>
+                                        <p:attrNameLst>
+                                          <p:attrName>style.visibility</p:attrName>
+                                        </p:attrNameLst>
+                                      </p:cBhvr>
+                                      <p:to>
+                                        <p:strVal val="visible"/>
+                                      </p:to>
+                                    </p:set>
+                                    <p:animEffect transition="in" filter="fade">
+                                      <p:cBhvr>
+                                        <p:cTn id="22" dur="500"/>
+                                        <p:tgtEl>
+                                          <p:spTgt spid="3">
+                                            <p:txEl>
+                                              <p:pRg st="3" end="3"/>
                                             </p:txEl>
                                           </p:spTgt>
                                         </p:tgtEl>
@@ -13590,7 +14159,7 @@
   <a:extraClrSchemeLst/>
   <a:extLst>
     <a:ext uri="{05A4C25C-085E-4340-85A3-A5531E510DB2}">
-      <thm15:themeFamily xmlns:thm15="http://schemas.microsoft.com/office/thememl/2012/main" name="Office Theme" id="{62F939B6-93AF-4DB8-9C6B-D6C7DFDC589F}" vid="{4A3C46E8-61CC-4603-A589-7422A47A8E4A}"/>
+      <thm15:themeFamily xmlns:thm15="http://schemas.microsoft.com/office/thememl/2012/main" xmlns="" name="Office Theme" id="{62F939B6-93AF-4DB8-9C6B-D6C7DFDC589F}" vid="{4A3C46E8-61CC-4603-A589-7422A47A8E4A}"/>
     </a:ext>
   </a:extLst>
 </a:theme>

</xml_diff>